<commit_message>
open in windowed mode
</commit_message>
<xml_diff>
--- a/quick start to eagle.pptx
+++ b/quick start to eagle.pptx
@@ -251,7 +251,7 @@
           <a:p>
             <a:fld id="{755C7FD4-0C1A-4BFD-AE4A-FAF0D96917C3}" type="datetimeFigureOut">
               <a:rPr lang="en-SG" smtClean="0"/>
-              <a:t>17/4/2016</a:t>
+              <a:t>26/4/16</a:t>
             </a:fld>
             <a:endParaRPr lang="en-SG"/>
           </a:p>
@@ -1742,7 +1742,7 @@
           <a:p>
             <a:fld id="{3473D299-85A2-484C-9FAE-F55C221D345E}" type="datetime1">
               <a:rPr lang="en-SG" smtClean="0"/>
-              <a:t>17/4/2016</a:t>
+              <a:t>26/4/16</a:t>
             </a:fld>
             <a:endParaRPr lang="en-SG"/>
           </a:p>
@@ -1912,7 +1912,7 @@
           <a:p>
             <a:fld id="{CE316A51-872A-3F4A-AC0F-F4C443F4AD21}" type="datetime1">
               <a:rPr lang="en-SG" smtClean="0"/>
-              <a:t>17/4/2016</a:t>
+              <a:t>26/4/16</a:t>
             </a:fld>
             <a:endParaRPr lang="en-SG"/>
           </a:p>
@@ -2092,7 +2092,7 @@
           <a:p>
             <a:fld id="{81A609D4-E295-074E-B1BC-B7C7C416C71C}" type="datetime1">
               <a:rPr lang="en-SG" smtClean="0"/>
-              <a:t>17/4/2016</a:t>
+              <a:t>26/4/16</a:t>
             </a:fld>
             <a:endParaRPr lang="en-SG"/>
           </a:p>
@@ -2262,7 +2262,7 @@
           <a:p>
             <a:fld id="{04CCE9BF-7F8F-0F42-8E7E-A93D90A39F97}" type="datetime1">
               <a:rPr lang="en-SG" smtClean="0"/>
-              <a:t>17/4/2016</a:t>
+              <a:t>26/4/16</a:t>
             </a:fld>
             <a:endParaRPr lang="en-SG"/>
           </a:p>
@@ -2506,7 +2506,7 @@
           <a:p>
             <a:fld id="{BD2D3264-08E1-314A-9EB8-A9C00EA673CF}" type="datetime1">
               <a:rPr lang="en-SG" smtClean="0"/>
-              <a:t>17/4/2016</a:t>
+              <a:t>26/4/16</a:t>
             </a:fld>
             <a:endParaRPr lang="en-SG"/>
           </a:p>
@@ -2738,7 +2738,7 @@
           <a:p>
             <a:fld id="{B0F213B7-E396-EF45-B36B-33259141175A}" type="datetime1">
               <a:rPr lang="en-SG" smtClean="0"/>
-              <a:t>17/4/2016</a:t>
+              <a:t>26/4/16</a:t>
             </a:fld>
             <a:endParaRPr lang="en-SG"/>
           </a:p>
@@ -3105,7 +3105,7 @@
           <a:p>
             <a:fld id="{0E406B25-9C64-4D42-9011-FE001E0F013D}" type="datetime1">
               <a:rPr lang="en-SG" smtClean="0"/>
-              <a:t>17/4/2016</a:t>
+              <a:t>26/4/16</a:t>
             </a:fld>
             <a:endParaRPr lang="en-SG"/>
           </a:p>
@@ -3223,7 +3223,7 @@
           <a:p>
             <a:fld id="{C186A9E5-DA17-EC43-8463-539381F79AC7}" type="datetime1">
               <a:rPr lang="en-SG" smtClean="0"/>
-              <a:t>17/4/2016</a:t>
+              <a:t>26/4/16</a:t>
             </a:fld>
             <a:endParaRPr lang="en-SG"/>
           </a:p>
@@ -3318,7 +3318,7 @@
           <a:p>
             <a:fld id="{66E93663-D8C2-ED48-AAC5-3E1AD476A732}" type="datetime1">
               <a:rPr lang="en-SG" smtClean="0"/>
-              <a:t>17/4/2016</a:t>
+              <a:t>26/4/16</a:t>
             </a:fld>
             <a:endParaRPr lang="en-SG"/>
           </a:p>
@@ -3595,7 +3595,7 @@
           <a:p>
             <a:fld id="{98D4308E-95B1-2B4F-B3AD-EE06552A54F0}" type="datetime1">
               <a:rPr lang="en-SG" smtClean="0"/>
-              <a:t>17/4/2016</a:t>
+              <a:t>26/4/16</a:t>
             </a:fld>
             <a:endParaRPr lang="en-SG"/>
           </a:p>
@@ -3852,7 +3852,7 @@
           <a:p>
             <a:fld id="{C9F0117B-BE6E-C046-966A-32A1D49D41F7}" type="datetime1">
               <a:rPr lang="en-SG" smtClean="0"/>
-              <a:t>17/4/2016</a:t>
+              <a:t>26/4/16</a:t>
             </a:fld>
             <a:endParaRPr lang="en-SG"/>
           </a:p>
@@ -4065,7 +4065,7 @@
           <a:p>
             <a:fld id="{6A6AB0BA-5AE0-9E4A-9F86-FC46A56831C6}" type="datetime1">
               <a:rPr lang="en-SG" smtClean="0"/>
-              <a:t>17/4/2016</a:t>
+              <a:t>26/4/16</a:t>
             </a:fld>
             <a:endParaRPr lang="en-SG"/>
           </a:p>

</xml_diff>